<commit_message>
update branch and ci presentation with new CIs
Signed-off-by: Steve Richmond <Steve.Richmond@silabs.com>
</commit_message>
<xml_diff>
--- a/verif/Common/Presentations/20210311-Branches and CIs for core-v-verif.pptx
+++ b/verif/Common/Presentations/20210311-Branches and CIs for core-v-verif.pptx
@@ -232,7 +232,7 @@
           <a:p>
             <a:fld id="{5B590C58-DF70-2946-A94D-AEAAF9A35B1E}" type="datetimeFigureOut">
               <a:rPr lang="en-US" smtClean="0"/>
-              <a:t>3/11/2021</a:t>
+              <a:t>3/18/2021</a:t>
             </a:fld>
             <a:endParaRPr lang="en-US"/>
           </a:p>
@@ -3926,7 +3926,7 @@
               <a:t>core-v-</a:t>
             </a:r>
             <a:r>
-              <a:rPr lang="en-US" i="1"/>
+              <a:rPr lang="en-US" i="1" dirty="0" err="1"/>
               <a:t>verif</a:t>
             </a:r>
             <a:endParaRPr lang="en-US" dirty="0"/>
@@ -4220,14 +4220,14 @@
           <p:nvPr>
             <p:extLst>
               <p:ext uri="{D42A27DB-BD31-4B8C-83A1-F6EECF244321}">
-                <p14:modId xmlns:p14="http://schemas.microsoft.com/office/powerpoint/2010/main" val="1823219864"/>
+                <p14:modId xmlns:p14="http://schemas.microsoft.com/office/powerpoint/2010/main" val="3884431585"/>
               </p:ext>
             </p:extLst>
           </p:nvPr>
         </p:nvGraphicFramePr>
         <p:xfrm>
-          <a:off x="838200" y="1449771"/>
-          <a:ext cx="8127999" cy="4381289"/>
+          <a:off x="838199" y="1449771"/>
+          <a:ext cx="9757096" cy="4211320"/>
         </p:xfrm>
         <a:graphic>
           <a:graphicData uri="http://schemas.openxmlformats.org/drawingml/2006/table">
@@ -4236,21 +4236,28 @@
                 <a:tableStyleId>{5C22544A-7EE6-4342-B048-85BDC9FD1C3A}</a:tableStyleId>
               </a:tblPr>
               <a:tblGrid>
-                <a:gridCol w="2709333">
+                <a:gridCol w="2014058">
                   <a:extLst>
                     <a:ext uri="{9D8B030D-6E8A-4147-A177-3AD203B41FA5}">
                       <a16:colId xmlns:a16="http://schemas.microsoft.com/office/drawing/2014/main" val="3259474659"/>
                     </a:ext>
                   </a:extLst>
                 </a:gridCol>
-                <a:gridCol w="2709333">
+                <a:gridCol w="2441196">
                   <a:extLst>
                     <a:ext uri="{9D8B030D-6E8A-4147-A177-3AD203B41FA5}">
                       <a16:colId xmlns:a16="http://schemas.microsoft.com/office/drawing/2014/main" val="4151397376"/>
                     </a:ext>
                   </a:extLst>
                 </a:gridCol>
-                <a:gridCol w="2709333">
+                <a:gridCol w="2862568">
+                  <a:extLst>
+                    <a:ext uri="{9D8B030D-6E8A-4147-A177-3AD203B41FA5}">
+                      <a16:colId xmlns:a16="http://schemas.microsoft.com/office/drawing/2014/main" val="1947289801"/>
+                    </a:ext>
+                  </a:extLst>
+                </a:gridCol>
+                <a:gridCol w="2439274">
                   <a:extLst>
                     <a:ext uri="{9D8B030D-6E8A-4147-A177-3AD203B41FA5}">
                       <a16:colId xmlns:a16="http://schemas.microsoft.com/office/drawing/2014/main" val="1611250444"/>
@@ -4292,6 +4299,19 @@
                     <a:p>
                       <a:r>
                         <a:rPr lang="en-US" dirty="0"/>
+                        <a:t>Name (Metrics)</a:t>
+                      </a:r>
+                    </a:p>
+                  </a:txBody>
+                  <a:tcPr/>
+                </a:tc>
+                <a:tc>
+                  <a:txBody>
+                    <a:bodyPr/>
+                    <a:lstStyle/>
+                    <a:p>
+                      <a:r>
+                        <a:rPr lang="en-US" dirty="0"/>
                         <a:t>Typical Action(s)</a:t>
                       </a:r>
                     </a:p>
@@ -4311,7 +4331,7 @@
                     <a:lstStyle/>
                     <a:p>
                       <a:r>
-                        <a:rPr lang="en-US" dirty="0"/>
+                        <a:rPr lang="en-US" sz="1400" dirty="0"/>
                         <a:t>cv32e40x/dev</a:t>
                       </a:r>
                     </a:p>
@@ -4324,7 +4344,7 @@
                     <a:lstStyle/>
                     <a:p>
                       <a:r>
-                        <a:rPr lang="en-US" dirty="0"/>
+                        <a:rPr lang="en-US" sz="1400" dirty="0"/>
                         <a:t>cv32e40x_ci_check.yaml</a:t>
                       </a:r>
                     </a:p>
@@ -4337,14 +4357,27 @@
                     <a:lstStyle/>
                     <a:p>
                       <a:r>
-                        <a:rPr lang="en-US" dirty="0"/>
+                        <a:rPr lang="en-US" sz="1400" dirty="0"/>
+                        <a:t>cv32e40x_ci_check_dev</a:t>
+                      </a:r>
+                    </a:p>
+                  </a:txBody>
+                  <a:tcPr/>
+                </a:tc>
+                <a:tc>
+                  <a:txBody>
+                    <a:bodyPr/>
+                    <a:lstStyle/>
+                    <a:p>
+                      <a:r>
+                        <a:rPr lang="en-US" sz="1400" dirty="0"/>
                         <a:t>User PR approval</a:t>
                       </a:r>
                     </a:p>
                     <a:p>
                       <a:r>
-                        <a:rPr lang="en-US" dirty="0"/>
-                        <a:t>Release merge-back</a:t>
+                        <a:rPr lang="en-US" sz="1400" dirty="0"/>
+                        <a:t>Release merge-back PR</a:t>
                       </a:r>
                     </a:p>
                   </a:txBody>
@@ -4380,43 +4413,8 @@
                         <a:defRPr/>
                       </a:pPr>
                       <a:r>
-                        <a:rPr lang="en-US" dirty="0"/>
-                        <a:t>cv32e40x/</a:t>
-                      </a:r>
-                      <a:r>
-                        <a:rPr lang="en-US" dirty="0" err="1"/>
-                        <a:t>rel</a:t>
-                      </a:r>
-                      <a:endParaRPr lang="en-US" dirty="0"/>
-                    </a:p>
-                  </a:txBody>
-                  <a:tcPr/>
-                </a:tc>
-                <a:tc>
-                  <a:txBody>
-                    <a:bodyPr/>
-                    <a:lstStyle/>
-                    <a:p>
-                      <a:pPr marL="0" marR="0" lvl="0" indent="0" algn="l" defTabSz="914400" rtl="0" eaLnBrk="1" fontAlgn="auto" latinLnBrk="0" hangingPunct="1">
-                        <a:lnSpc>
-                          <a:spcPct val="100000"/>
-                        </a:lnSpc>
-                        <a:spcBef>
-                          <a:spcPts val="0"/>
-                        </a:spcBef>
-                        <a:spcAft>
-                          <a:spcPts val="0"/>
-                        </a:spcAft>
-                        <a:buClrTx/>
-                        <a:buSzTx/>
-                        <a:buFontTx/>
-                        <a:buNone/>
-                        <a:tabLst/>
-                        <a:defRPr/>
-                      </a:pPr>
-                      <a:r>
-                        <a:rPr lang="en-US" dirty="0"/>
-                        <a:t>cv32e40x_ci_check.yaml</a:t>
+                        <a:rPr lang="en-US" sz="1400" dirty="0"/>
+                        <a:t>cv32e40x/release</a:t>
                       </a:r>
                     </a:p>
                   </a:txBody>
@@ -4445,8 +4443,91 @@
                         <a:defRPr/>
                       </a:pPr>
                       <a:r>
-                        <a:rPr lang="en-US" dirty="0"/>
-                        <a:t>Release branch staging</a:t>
+                        <a:rPr lang="en-US" sz="1400" dirty="0"/>
+                        <a:t>cv32e40x_rel_check.yaml</a:t>
+                      </a:r>
+                    </a:p>
+                  </a:txBody>
+                  <a:tcPr/>
+                </a:tc>
+                <a:tc>
+                  <a:txBody>
+                    <a:bodyPr/>
+                    <a:lstStyle/>
+                    <a:p>
+                      <a:pPr marL="0" marR="0" lvl="0" indent="0" algn="l" defTabSz="914400" rtl="0" eaLnBrk="1" fontAlgn="auto" latinLnBrk="0" hangingPunct="1">
+                        <a:lnSpc>
+                          <a:spcPct val="100000"/>
+                        </a:lnSpc>
+                        <a:spcBef>
+                          <a:spcPts val="0"/>
+                        </a:spcBef>
+                        <a:spcAft>
+                          <a:spcPts val="0"/>
+                        </a:spcAft>
+                        <a:buClrTx/>
+                        <a:buSzTx/>
+                        <a:buFontTx/>
+                        <a:buNone/>
+                        <a:tabLst/>
+                        <a:defRPr/>
+                      </a:pPr>
+                      <a:r>
+                        <a:rPr lang="en-US" sz="1400" dirty="0"/>
+                        <a:t>cv32e40x_ci_check_release</a:t>
+                      </a:r>
+                    </a:p>
+                  </a:txBody>
+                  <a:tcPr/>
+                </a:tc>
+                <a:tc>
+                  <a:txBody>
+                    <a:bodyPr/>
+                    <a:lstStyle/>
+                    <a:p>
+                      <a:pPr marL="0" marR="0" lvl="0" indent="0" algn="l" defTabSz="914400" rtl="0" eaLnBrk="1" fontAlgn="auto" latinLnBrk="0" hangingPunct="1">
+                        <a:lnSpc>
+                          <a:spcPct val="100000"/>
+                        </a:lnSpc>
+                        <a:spcBef>
+                          <a:spcPts val="0"/>
+                        </a:spcBef>
+                        <a:spcAft>
+                          <a:spcPts val="0"/>
+                        </a:spcAft>
+                        <a:buClrTx/>
+                        <a:buSzTx/>
+                        <a:buFontTx/>
+                        <a:buNone/>
+                        <a:tabLst/>
+                        <a:defRPr/>
+                      </a:pPr>
+                      <a:r>
+                        <a:rPr lang="en-US" sz="1400" dirty="0"/>
+                        <a:t>Release branch PR</a:t>
+                      </a:r>
+                    </a:p>
+                    <a:p>
+                      <a:pPr marL="0" marR="0" lvl="0" indent="0" algn="l" defTabSz="914400" rtl="0" eaLnBrk="1" fontAlgn="auto" latinLnBrk="0" hangingPunct="1">
+                        <a:lnSpc>
+                          <a:spcPct val="100000"/>
+                        </a:lnSpc>
+                        <a:spcBef>
+                          <a:spcPts val="0"/>
+                        </a:spcBef>
+                        <a:spcAft>
+                          <a:spcPts val="0"/>
+                        </a:spcAft>
+                        <a:buClrTx/>
+                        <a:buSzTx/>
+                        <a:buFontTx/>
+                        <a:buNone/>
+                        <a:tabLst/>
+                        <a:defRPr/>
+                      </a:pPr>
+                      <a:r>
+                        <a:rPr lang="en-US" sz="1400" dirty="0"/>
+                        <a:t>Release merge-back PR</a:t>
                       </a:r>
                     </a:p>
                   </a:txBody>
@@ -4482,7 +4563,7 @@
                         <a:defRPr/>
                       </a:pPr>
                       <a:r>
-                        <a:rPr lang="en-US" dirty="0"/>
+                        <a:rPr lang="en-US" sz="1400" dirty="0"/>
                         <a:t>cv32e40p/dev</a:t>
                       </a:r>
                     </a:p>
@@ -4512,7 +4593,7 @@
                         <a:defRPr/>
                       </a:pPr>
                       <a:r>
-                        <a:rPr lang="en-US" dirty="0"/>
+                        <a:rPr lang="en-US" sz="1400" dirty="0"/>
                         <a:t>cv32e40p_ci_check.yaml</a:t>
                       </a:r>
                     </a:p>
@@ -4524,49 +4605,28 @@
                     <a:bodyPr/>
                     <a:lstStyle/>
                     <a:p>
-                      <a:pPr marL="0" marR="0" lvl="0" indent="0" algn="l" defTabSz="914400" rtl="0" eaLnBrk="1" fontAlgn="auto" latinLnBrk="0" hangingPunct="1">
-                        <a:lnSpc>
-                          <a:spcPct val="100000"/>
-                        </a:lnSpc>
-                        <a:spcBef>
-                          <a:spcPts val="0"/>
-                        </a:spcBef>
-                        <a:spcAft>
-                          <a:spcPts val="0"/>
-                        </a:spcAft>
-                        <a:buClrTx/>
-                        <a:buSzTx/>
-                        <a:buFontTx/>
-                        <a:buNone/>
-                        <a:tabLst/>
-                        <a:defRPr/>
-                      </a:pPr>
                       <a:r>
-                        <a:rPr lang="en-US" dirty="0"/>
-                        <a:t>User PR Approval</a:t>
+                        <a:rPr lang="en-US" sz="1400" dirty="0"/>
+                        <a:t>cv32e40p_ci_check_dev</a:t>
+                      </a:r>
+                    </a:p>
+                  </a:txBody>
+                  <a:tcPr/>
+                </a:tc>
+                <a:tc>
+                  <a:txBody>
+                    <a:bodyPr/>
+                    <a:lstStyle/>
+                    <a:p>
+                      <a:r>
+                        <a:rPr lang="en-US" sz="1400" dirty="0"/>
+                        <a:t>User PR approval</a:t>
                       </a:r>
                     </a:p>
                     <a:p>
-                      <a:pPr marL="0" marR="0" lvl="0" indent="0" algn="l" defTabSz="914400" rtl="0" eaLnBrk="1" fontAlgn="auto" latinLnBrk="0" hangingPunct="1">
-                        <a:lnSpc>
-                          <a:spcPct val="100000"/>
-                        </a:lnSpc>
-                        <a:spcBef>
-                          <a:spcPts val="0"/>
-                        </a:spcBef>
-                        <a:spcAft>
-                          <a:spcPts val="0"/>
-                        </a:spcAft>
-                        <a:buClrTx/>
-                        <a:buSzTx/>
-                        <a:buFontTx/>
-                        <a:buNone/>
-                        <a:tabLst/>
-                        <a:defRPr/>
-                      </a:pPr>
                       <a:r>
-                        <a:rPr lang="en-US" dirty="0"/>
-                        <a:t>Release merge-back</a:t>
+                        <a:rPr lang="en-US" sz="1400" dirty="0"/>
+                        <a:t>Release merge-back PR</a:t>
                       </a:r>
                     </a:p>
                   </a:txBody>
@@ -4602,43 +4662,8 @@
                         <a:defRPr/>
                       </a:pPr>
                       <a:r>
-                        <a:rPr lang="en-US" dirty="0"/>
-                        <a:t>cv32e40p/</a:t>
-                      </a:r>
-                      <a:r>
-                        <a:rPr lang="en-US" dirty="0" err="1"/>
-                        <a:t>rel</a:t>
-                      </a:r>
-                      <a:endParaRPr lang="en-US" dirty="0"/>
-                    </a:p>
-                  </a:txBody>
-                  <a:tcPr/>
-                </a:tc>
-                <a:tc>
-                  <a:txBody>
-                    <a:bodyPr/>
-                    <a:lstStyle/>
-                    <a:p>
-                      <a:pPr marL="0" marR="0" lvl="0" indent="0" algn="l" defTabSz="914400" rtl="0" eaLnBrk="1" fontAlgn="auto" latinLnBrk="0" hangingPunct="1">
-                        <a:lnSpc>
-                          <a:spcPct val="100000"/>
-                        </a:lnSpc>
-                        <a:spcBef>
-                          <a:spcPts val="0"/>
-                        </a:spcBef>
-                        <a:spcAft>
-                          <a:spcPts val="0"/>
-                        </a:spcAft>
-                        <a:buClrTx/>
-                        <a:buSzTx/>
-                        <a:buFontTx/>
-                        <a:buNone/>
-                        <a:tabLst/>
-                        <a:defRPr/>
-                      </a:pPr>
-                      <a:r>
-                        <a:rPr lang="en-US" dirty="0"/>
-                        <a:t>cv32e40p_ci_check.yaml</a:t>
+                        <a:rPr lang="en-US" sz="1400" dirty="0"/>
+                        <a:t>cv32e40p/release</a:t>
                       </a:r>
                     </a:p>
                   </a:txBody>
@@ -4667,8 +4692,91 @@
                         <a:defRPr/>
                       </a:pPr>
                       <a:r>
-                        <a:rPr lang="en-US" dirty="0"/>
-                        <a:t>Release branch staging</a:t>
+                        <a:rPr lang="en-US" sz="1400" dirty="0"/>
+                        <a:t>cv32e40p_rel_check.yaml</a:t>
+                      </a:r>
+                    </a:p>
+                  </a:txBody>
+                  <a:tcPr/>
+                </a:tc>
+                <a:tc>
+                  <a:txBody>
+                    <a:bodyPr/>
+                    <a:lstStyle/>
+                    <a:p>
+                      <a:pPr marL="0" marR="0" lvl="0" indent="0" algn="l" defTabSz="914400" rtl="0" eaLnBrk="1" fontAlgn="auto" latinLnBrk="0" hangingPunct="1">
+                        <a:lnSpc>
+                          <a:spcPct val="100000"/>
+                        </a:lnSpc>
+                        <a:spcBef>
+                          <a:spcPts val="0"/>
+                        </a:spcBef>
+                        <a:spcAft>
+                          <a:spcPts val="0"/>
+                        </a:spcAft>
+                        <a:buClrTx/>
+                        <a:buSzTx/>
+                        <a:buFontTx/>
+                        <a:buNone/>
+                        <a:tabLst/>
+                        <a:defRPr/>
+                      </a:pPr>
+                      <a:r>
+                        <a:rPr lang="en-US" sz="1400" dirty="0"/>
+                        <a:t>cv32e40p_rel_check_release</a:t>
+                      </a:r>
+                    </a:p>
+                  </a:txBody>
+                  <a:tcPr/>
+                </a:tc>
+                <a:tc>
+                  <a:txBody>
+                    <a:bodyPr/>
+                    <a:lstStyle/>
+                    <a:p>
+                      <a:pPr marL="0" marR="0" lvl="0" indent="0" algn="l" defTabSz="914400" rtl="0" eaLnBrk="1" fontAlgn="auto" latinLnBrk="0" hangingPunct="1">
+                        <a:lnSpc>
+                          <a:spcPct val="100000"/>
+                        </a:lnSpc>
+                        <a:spcBef>
+                          <a:spcPts val="0"/>
+                        </a:spcBef>
+                        <a:spcAft>
+                          <a:spcPts val="0"/>
+                        </a:spcAft>
+                        <a:buClrTx/>
+                        <a:buSzTx/>
+                        <a:buFontTx/>
+                        <a:buNone/>
+                        <a:tabLst/>
+                        <a:defRPr/>
+                      </a:pPr>
+                      <a:r>
+                        <a:rPr lang="en-US" sz="1400" dirty="0"/>
+                        <a:t>Release branch PR</a:t>
+                      </a:r>
+                    </a:p>
+                    <a:p>
+                      <a:pPr marL="0" marR="0" lvl="0" indent="0" algn="l" defTabSz="914400" rtl="0" eaLnBrk="1" fontAlgn="auto" latinLnBrk="0" hangingPunct="1">
+                        <a:lnSpc>
+                          <a:spcPct val="100000"/>
+                        </a:lnSpc>
+                        <a:spcBef>
+                          <a:spcPts val="0"/>
+                        </a:spcBef>
+                        <a:spcAft>
+                          <a:spcPts val="0"/>
+                        </a:spcAft>
+                        <a:buClrTx/>
+                        <a:buSzTx/>
+                        <a:buFontTx/>
+                        <a:buNone/>
+                        <a:tabLst/>
+                        <a:defRPr/>
+                      </a:pPr>
+                      <a:r>
+                        <a:rPr lang="en-US" sz="1400" dirty="0"/>
+                        <a:t>Release merge-back PR</a:t>
                       </a:r>
                     </a:p>
                   </a:txBody>
@@ -4704,7 +4812,7 @@
                         <a:defRPr/>
                       </a:pPr>
                       <a:r>
-                        <a:rPr lang="en-US" dirty="0"/>
+                        <a:rPr lang="en-US" sz="1400" dirty="0"/>
                         <a:t>cv32e40s/dev</a:t>
                       </a:r>
                     </a:p>
@@ -4734,7 +4842,7 @@
                         <a:defRPr/>
                       </a:pPr>
                       <a:r>
-                        <a:rPr lang="en-US" dirty="0"/>
+                        <a:rPr lang="en-US" sz="1400" dirty="0"/>
                         <a:t>cv32e40s_ci_check.yaml</a:t>
                       </a:r>
                     </a:p>
@@ -4746,15 +4854,45 @@
                     <a:bodyPr/>
                     <a:lstStyle/>
                     <a:p>
+                      <a:pPr marL="0" marR="0" lvl="0" indent="0" algn="l" defTabSz="914400" rtl="0" eaLnBrk="1" fontAlgn="auto" latinLnBrk="0" hangingPunct="1">
+                        <a:lnSpc>
+                          <a:spcPct val="100000"/>
+                        </a:lnSpc>
+                        <a:spcBef>
+                          <a:spcPts val="0"/>
+                        </a:spcBef>
+                        <a:spcAft>
+                          <a:spcPts val="0"/>
+                        </a:spcAft>
+                        <a:buClrTx/>
+                        <a:buSzTx/>
+                        <a:buFontTx/>
+                        <a:buNone/>
+                        <a:tabLst/>
+                        <a:defRPr/>
+                      </a:pPr>
                       <a:r>
-                        <a:rPr lang="en-US" dirty="0"/>
+                        <a:rPr lang="en-US" sz="1400" dirty="0"/>
+                        <a:t>cv32e40s_ci_check_dev</a:t>
+                      </a:r>
+                    </a:p>
+                  </a:txBody>
+                  <a:tcPr/>
+                </a:tc>
+                <a:tc>
+                  <a:txBody>
+                    <a:bodyPr/>
+                    <a:lstStyle/>
+                    <a:p>
+                      <a:r>
+                        <a:rPr lang="en-US" sz="1400" dirty="0"/>
                         <a:t>User PR approval</a:t>
                       </a:r>
                     </a:p>
                     <a:p>
                       <a:r>
-                        <a:rPr lang="en-US" dirty="0"/>
-                        <a:t>Release merge-back</a:t>
+                        <a:rPr lang="en-US" sz="1400" dirty="0"/>
+                        <a:t>Release merge-back PR</a:t>
                       </a:r>
                     </a:p>
                   </a:txBody>
@@ -4790,14 +4928,14 @@
                         <a:defRPr/>
                       </a:pPr>
                       <a:r>
-                        <a:rPr lang="en-US" dirty="0"/>
+                        <a:rPr lang="en-US" sz="1400" dirty="0"/>
                         <a:t>cv32e40s/</a:t>
                       </a:r>
                       <a:r>
-                        <a:rPr lang="en-US" dirty="0" err="1"/>
+                        <a:rPr lang="en-US" sz="1400" dirty="0" err="1"/>
                         <a:t>rel</a:t>
                       </a:r>
-                      <a:endParaRPr lang="en-US" dirty="0"/>
+                      <a:endParaRPr lang="en-US" sz="1400" dirty="0"/>
                     </a:p>
                   </a:txBody>
                   <a:tcPr/>
@@ -4825,8 +4963,8 @@
                         <a:defRPr/>
                       </a:pPr>
                       <a:r>
-                        <a:rPr lang="en-US" dirty="0"/>
-                        <a:t>cv32e40s_ci_check.yaml</a:t>
+                        <a:rPr lang="en-US" sz="1400" dirty="0"/>
+                        <a:t>cv32e40s_rel_check.yaml</a:t>
                       </a:r>
                     </a:p>
                   </a:txBody>
@@ -4855,8 +4993,61 @@
                         <a:defRPr/>
                       </a:pPr>
                       <a:r>
-                        <a:rPr lang="en-US" dirty="0"/>
-                        <a:t>Release branch staging</a:t>
+                        <a:rPr lang="en-US" sz="1400" dirty="0"/>
+                        <a:t>cv32e40s_rel_check_release</a:t>
+                      </a:r>
+                    </a:p>
+                  </a:txBody>
+                  <a:tcPr/>
+                </a:tc>
+                <a:tc>
+                  <a:txBody>
+                    <a:bodyPr/>
+                    <a:lstStyle/>
+                    <a:p>
+                      <a:pPr marL="0" marR="0" lvl="0" indent="0" algn="l" defTabSz="914400" rtl="0" eaLnBrk="1" fontAlgn="auto" latinLnBrk="0" hangingPunct="1">
+                        <a:lnSpc>
+                          <a:spcPct val="100000"/>
+                        </a:lnSpc>
+                        <a:spcBef>
+                          <a:spcPts val="0"/>
+                        </a:spcBef>
+                        <a:spcAft>
+                          <a:spcPts val="0"/>
+                        </a:spcAft>
+                        <a:buClrTx/>
+                        <a:buSzTx/>
+                        <a:buFontTx/>
+                        <a:buNone/>
+                        <a:tabLst/>
+                        <a:defRPr/>
+                      </a:pPr>
+                      <a:r>
+                        <a:rPr lang="en-US" sz="1400" dirty="0"/>
+                        <a:t>Release branch PR</a:t>
+                      </a:r>
+                    </a:p>
+                    <a:p>
+                      <a:pPr marL="0" marR="0" lvl="0" indent="0" algn="l" defTabSz="914400" rtl="0" eaLnBrk="1" fontAlgn="auto" latinLnBrk="0" hangingPunct="1">
+                        <a:lnSpc>
+                          <a:spcPct val="100000"/>
+                        </a:lnSpc>
+                        <a:spcBef>
+                          <a:spcPts val="0"/>
+                        </a:spcBef>
+                        <a:spcAft>
+                          <a:spcPts val="0"/>
+                        </a:spcAft>
+                        <a:buClrTx/>
+                        <a:buSzTx/>
+                        <a:buFontTx/>
+                        <a:buNone/>
+                        <a:tabLst/>
+                        <a:defRPr/>
+                      </a:pPr>
+                      <a:r>
+                        <a:rPr lang="en-US" sz="1400" dirty="0"/>
+                        <a:t>Release merge-back PR</a:t>
                       </a:r>
                     </a:p>
                   </a:txBody>
@@ -4875,7 +5066,7 @@
                     <a:lstStyle/>
                     <a:p>
                       <a:r>
-                        <a:rPr lang="en-US" dirty="0"/>
+                        <a:rPr lang="en-US" sz="1400" dirty="0"/>
                         <a:t>master</a:t>
                       </a:r>
                     </a:p>
@@ -4905,8 +5096,8 @@
                         <a:defRPr/>
                       </a:pPr>
                       <a:r>
-                        <a:rPr lang="en-US" dirty="0"/>
-                        <a:t>cv32e40x_ci_check.yaml</a:t>
+                        <a:rPr lang="en-US" sz="1400" dirty="0"/>
+                        <a:t>cv32e40x_rel_check.yaml</a:t>
                       </a:r>
                     </a:p>
                     <a:p>
@@ -4928,8 +5119,8 @@
                         <a:defRPr/>
                       </a:pPr>
                       <a:r>
-                        <a:rPr lang="en-US" dirty="0"/>
-                        <a:t>cv32e40p_ci_check.yaml</a:t>
+                        <a:rPr lang="en-US" sz="1400" dirty="0"/>
+                        <a:t>cv32e40p_rel_check.yaml</a:t>
                       </a:r>
                     </a:p>
                     <a:p>
@@ -4951,8 +5142,84 @@
                         <a:defRPr/>
                       </a:pPr>
                       <a:r>
-                        <a:rPr lang="en-US" dirty="0"/>
-                        <a:t>cv32e40s_ci_check.yaml</a:t>
+                        <a:rPr lang="en-US" sz="1400" dirty="0"/>
+                        <a:t>cv32e40s_rel_check.yaml</a:t>
+                      </a:r>
+                    </a:p>
+                  </a:txBody>
+                  <a:tcPr/>
+                </a:tc>
+                <a:tc>
+                  <a:txBody>
+                    <a:bodyPr/>
+                    <a:lstStyle/>
+                    <a:p>
+                      <a:pPr marL="0" marR="0" lvl="0" indent="0" algn="l" defTabSz="914400" rtl="0" eaLnBrk="1" fontAlgn="auto" latinLnBrk="0" hangingPunct="1">
+                        <a:lnSpc>
+                          <a:spcPct val="100000"/>
+                        </a:lnSpc>
+                        <a:spcBef>
+                          <a:spcPts val="0"/>
+                        </a:spcBef>
+                        <a:spcAft>
+                          <a:spcPts val="0"/>
+                        </a:spcAft>
+                        <a:buClrTx/>
+                        <a:buSzTx/>
+                        <a:buFontTx/>
+                        <a:buNone/>
+                        <a:tabLst/>
+                        <a:defRPr/>
+                      </a:pPr>
+                      <a:r>
+                        <a:rPr lang="en-US" sz="1400" dirty="0"/>
+                        <a:t>cv32e40x_rel_check_master</a:t>
+                      </a:r>
+                    </a:p>
+                    <a:p>
+                      <a:pPr marL="0" marR="0" lvl="0" indent="0" algn="l" defTabSz="914400" rtl="0" eaLnBrk="1" fontAlgn="auto" latinLnBrk="0" hangingPunct="1">
+                        <a:lnSpc>
+                          <a:spcPct val="100000"/>
+                        </a:lnSpc>
+                        <a:spcBef>
+                          <a:spcPts val="0"/>
+                        </a:spcBef>
+                        <a:spcAft>
+                          <a:spcPts val="0"/>
+                        </a:spcAft>
+                        <a:buClrTx/>
+                        <a:buSzTx/>
+                        <a:buFontTx/>
+                        <a:buNone/>
+                        <a:tabLst/>
+                        <a:defRPr/>
+                      </a:pPr>
+                      <a:r>
+                        <a:rPr lang="en-US" sz="1400" dirty="0"/>
+                        <a:t>cv32e40p_rel_check_master</a:t>
+                      </a:r>
+                    </a:p>
+                    <a:p>
+                      <a:pPr marL="0" marR="0" lvl="0" indent="0" algn="l" defTabSz="914400" rtl="0" eaLnBrk="1" fontAlgn="auto" latinLnBrk="0" hangingPunct="1">
+                        <a:lnSpc>
+                          <a:spcPct val="100000"/>
+                        </a:lnSpc>
+                        <a:spcBef>
+                          <a:spcPts val="0"/>
+                        </a:spcBef>
+                        <a:spcAft>
+                          <a:spcPts val="0"/>
+                        </a:spcAft>
+                        <a:buClrTx/>
+                        <a:buSzTx/>
+                        <a:buFontTx/>
+                        <a:buNone/>
+                        <a:tabLst/>
+                        <a:defRPr/>
+                      </a:pPr>
+                      <a:r>
+                        <a:rPr lang="en-US" sz="1400" dirty="0"/>
+                        <a:t>cv32e40s_rel_check_master</a:t>
                       </a:r>
                     </a:p>
                   </a:txBody>
@@ -4964,13 +5231,13 @@
                     <a:lstStyle/>
                     <a:p>
                       <a:r>
-                        <a:rPr lang="en-US" dirty="0"/>
+                        <a:rPr lang="en-US" sz="1400" dirty="0"/>
                         <a:t>User hotfix PR approval</a:t>
                       </a:r>
                     </a:p>
                     <a:p>
                       <a:r>
-                        <a:rPr lang="en-US" dirty="0"/>
+                        <a:rPr lang="en-US" sz="1400" dirty="0"/>
                         <a:t>Merges from release branch</a:t>
                       </a:r>
                     </a:p>
@@ -5073,6 +5340,13 @@
           </a:p>
           <a:p>
             <a:r>
+              <a:rPr lang="en-US"/>
+              <a:t>On /dev branches</a:t>
+            </a:r>
+            <a:endParaRPr lang="en-US" dirty="0"/>
+          </a:p>
+          <a:p>
+            <a:r>
               <a:rPr lang="en-US" dirty="0"/>
               <a:t>Minimal set per core:</a:t>
             </a:r>
@@ -6156,7 +6430,7 @@
             <a:pPr lvl="1"/>
             <a:r>
               <a:rPr lang="en-US" dirty="0"/>
-              <a:t>Used to stage a merge into master from a core/develop branch</a:t>
+              <a:t>Used to stage a merge into master from a core/dev branch</a:t>
             </a:r>
           </a:p>
           <a:p>
@@ -6954,7 +7228,7 @@
             <a:pPr lvl="1"/>
             <a:r>
               <a:rPr lang="en-US" dirty="0"/>
-              <a:t>Merge cv32e40s/release to cv32e40s/develop for each core</a:t>
+              <a:t>Merge cv32e40s/release to cv32e40s/dev for each core</a:t>
             </a:r>
           </a:p>
           <a:p>

</xml_diff>